<commit_message>
Added the PowerQuiz answer sheet to the repo and updated pptx
</commit_message>
<xml_diff>
--- a/DuPSuG_PowerShell_Saturday_2016_05_21/PowerQuiz/PowerQuiz.pptx
+++ b/DuPSuG_PowerShell_Saturday_2016_05_21/PowerQuiz/PowerQuiz.pptx
@@ -267,7 +267,7 @@
           <a:p>
             <a:fld id="{16401E7E-F81A-4A5A-A3A1-0B61C5618093}" type="datetimeFigureOut">
               <a:rPr lang="en-US" smtClean="0"/>
-              <a:t>5/21/2016</a:t>
+              <a:t>5/23/2016</a:t>
             </a:fld>
             <a:endParaRPr lang="en-US"/>
           </a:p>
@@ -435,7 +435,7 @@
           <a:p>
             <a:fld id="{16401E7E-F81A-4A5A-A3A1-0B61C5618093}" type="datetimeFigureOut">
               <a:rPr lang="en-US" smtClean="0"/>
-              <a:t>5/21/2016</a:t>
+              <a:t>5/23/2016</a:t>
             </a:fld>
             <a:endParaRPr lang="en-US"/>
           </a:p>
@@ -613,7 +613,7 @@
           <a:p>
             <a:fld id="{16401E7E-F81A-4A5A-A3A1-0B61C5618093}" type="datetimeFigureOut">
               <a:rPr lang="en-US" smtClean="0"/>
-              <a:t>5/21/2016</a:t>
+              <a:t>5/23/2016</a:t>
             </a:fld>
             <a:endParaRPr lang="en-US"/>
           </a:p>
@@ -781,7 +781,7 @@
           <a:p>
             <a:fld id="{16401E7E-F81A-4A5A-A3A1-0B61C5618093}" type="datetimeFigureOut">
               <a:rPr lang="en-US" smtClean="0"/>
-              <a:t>5/21/2016</a:t>
+              <a:t>5/23/2016</a:t>
             </a:fld>
             <a:endParaRPr lang="en-US"/>
           </a:p>
@@ -1026,7 +1026,7 @@
           <a:p>
             <a:fld id="{16401E7E-F81A-4A5A-A3A1-0B61C5618093}" type="datetimeFigureOut">
               <a:rPr lang="en-US" smtClean="0"/>
-              <a:t>5/21/2016</a:t>
+              <a:t>5/23/2016</a:t>
             </a:fld>
             <a:endParaRPr lang="en-US"/>
           </a:p>
@@ -1255,7 +1255,7 @@
           <a:p>
             <a:fld id="{16401E7E-F81A-4A5A-A3A1-0B61C5618093}" type="datetimeFigureOut">
               <a:rPr lang="en-US" smtClean="0"/>
-              <a:t>5/21/2016</a:t>
+              <a:t>5/23/2016</a:t>
             </a:fld>
             <a:endParaRPr lang="en-US"/>
           </a:p>
@@ -1619,7 +1619,7 @@
           <a:p>
             <a:fld id="{16401E7E-F81A-4A5A-A3A1-0B61C5618093}" type="datetimeFigureOut">
               <a:rPr lang="en-US" smtClean="0"/>
-              <a:t>5/21/2016</a:t>
+              <a:t>5/23/2016</a:t>
             </a:fld>
             <a:endParaRPr lang="en-US"/>
           </a:p>
@@ -1736,7 +1736,7 @@
           <a:p>
             <a:fld id="{16401E7E-F81A-4A5A-A3A1-0B61C5618093}" type="datetimeFigureOut">
               <a:rPr lang="en-US" smtClean="0"/>
-              <a:t>5/21/2016</a:t>
+              <a:t>5/23/2016</a:t>
             </a:fld>
             <a:endParaRPr lang="en-US"/>
           </a:p>
@@ -1831,7 +1831,7 @@
           <a:p>
             <a:fld id="{16401E7E-F81A-4A5A-A3A1-0B61C5618093}" type="datetimeFigureOut">
               <a:rPr lang="en-US" smtClean="0"/>
-              <a:t>5/21/2016</a:t>
+              <a:t>5/23/2016</a:t>
             </a:fld>
             <a:endParaRPr lang="en-US"/>
           </a:p>
@@ -2106,7 +2106,7 @@
           <a:p>
             <a:fld id="{16401E7E-F81A-4A5A-A3A1-0B61C5618093}" type="datetimeFigureOut">
               <a:rPr lang="en-US" smtClean="0"/>
-              <a:t>5/21/2016</a:t>
+              <a:t>5/23/2016</a:t>
             </a:fld>
             <a:endParaRPr lang="en-US"/>
           </a:p>
@@ -2358,7 +2358,7 @@
           <a:p>
             <a:fld id="{16401E7E-F81A-4A5A-A3A1-0B61C5618093}" type="datetimeFigureOut">
               <a:rPr lang="en-US" smtClean="0"/>
-              <a:t>5/21/2016</a:t>
+              <a:t>5/23/2016</a:t>
             </a:fld>
             <a:endParaRPr lang="en-US"/>
           </a:p>
@@ -2578,7 +2578,7 @@
           <a:p>
             <a:fld id="{16401E7E-F81A-4A5A-A3A1-0B61C5618093}" type="datetimeFigureOut">
               <a:rPr lang="en-US" smtClean="0"/>
-              <a:t>5/21/2016</a:t>
+              <a:t>5/23/2016</a:t>
             </a:fld>
             <a:endParaRPr lang="en-US"/>
           </a:p>
@@ -3117,7 +3117,7 @@
                 </a:solidFill>
                 <a:latin typeface="Lucida Console" panose="020B0609040504020204" pitchFamily="49" charset="0"/>
               </a:rPr>
-              <a:t>Questions</a:t>
+              <a:t>Question #5</a:t>
             </a:r>
           </a:p>
         </p:txBody>
@@ -3165,7 +3165,7 @@
                   <a:schemeClr val="bg1"/>
                 </a:solidFill>
               </a:rPr>
-              <a:t>()] indicate for a parameter block</a:t>
+              <a:t>()] indicate for a parameter block?</a:t>
             </a:r>
           </a:p>
         </p:txBody>
@@ -3222,7 +3222,7 @@
                 </a:solidFill>
                 <a:latin typeface="Lucida Console" panose="020B0609040504020204" pitchFamily="49" charset="0"/>
               </a:rPr>
-              <a:t>Questions</a:t>
+              <a:t>Question #6</a:t>
             </a:r>
           </a:p>
         </p:txBody>
@@ -3311,7 +3311,7 @@
                 </a:solidFill>
                 <a:latin typeface="Lucida Console" panose="020B0609040504020204" pitchFamily="49" charset="0"/>
               </a:rPr>
-              <a:t>Questions</a:t>
+              <a:t>Question #7</a:t>
             </a:r>
           </a:p>
         </p:txBody>
@@ -3326,7 +3326,12 @@
             <p:ph type="subTitle" idx="1"/>
           </p:nvPr>
         </p:nvSpPr>
-        <p:spPr/>
+        <p:spPr>
+          <a:xfrm>
+            <a:off x="1524000" y="3602038"/>
+            <a:ext cx="10109200" cy="1655762"/>
+          </a:xfrm>
+        </p:spPr>
         <p:txBody>
           <a:bodyPr>
             <a:normAutofit/>
@@ -3343,7 +3348,7 @@
                   <a:schemeClr val="bg1"/>
                 </a:solidFill>
               </a:rPr>
-              <a:t>Can you write this more efficiently?</a:t>
+              <a:t>Can you write this more efficiently? Create a code sample that gives the same output without the pipeline</a:t>
             </a:r>
           </a:p>
         </p:txBody>
@@ -3364,7 +3369,7 @@
         </p:blipFill>
         <p:spPr>
           <a:xfrm>
-            <a:off x="1380848" y="4429919"/>
+            <a:off x="1380848" y="4772819"/>
             <a:ext cx="9430303" cy="1225776"/>
           </a:xfrm>
           <a:prstGeom prst="rect">
@@ -3424,7 +3429,7 @@
                 </a:solidFill>
                 <a:latin typeface="Lucida Console" panose="020B0609040504020204" pitchFamily="49" charset="0"/>
               </a:rPr>
-              <a:t>Questions</a:t>
+              <a:t>Question #8</a:t>
             </a:r>
           </a:p>
         </p:txBody>
@@ -3513,7 +3518,7 @@
                 </a:solidFill>
                 <a:latin typeface="Lucida Console" panose="020B0609040504020204" pitchFamily="49" charset="0"/>
               </a:rPr>
-              <a:t>Questions</a:t>
+              <a:t>Question #9</a:t>
             </a:r>
           </a:p>
         </p:txBody>
@@ -3692,7 +3697,7 @@
                 </a:solidFill>
                 <a:latin typeface="Lucida Console" panose="020B0609040504020204" pitchFamily="49" charset="0"/>
               </a:rPr>
-              <a:t>Questions</a:t>
+              <a:t>Question #10</a:t>
             </a:r>
           </a:p>
         </p:txBody>
@@ -3816,7 +3821,7 @@
                 </a:solidFill>
                 <a:latin typeface="Lucida Console" panose="020B0609040504020204" pitchFamily="49" charset="0"/>
               </a:rPr>
-              <a:t>Questions</a:t>
+              <a:t>Question #11</a:t>
             </a:r>
           </a:p>
         </p:txBody>
@@ -3905,7 +3910,7 @@
                 </a:solidFill>
                 <a:latin typeface="Lucida Console" panose="020B0609040504020204" pitchFamily="49" charset="0"/>
               </a:rPr>
-              <a:t>Questions</a:t>
+              <a:t>Question #12</a:t>
             </a:r>
           </a:p>
         </p:txBody>
@@ -3937,7 +3942,7 @@
                   <a:schemeClr val="bg1"/>
                 </a:solidFill>
               </a:rPr>
-              <a:t>Why is there no output generated by this code:</a:t>
+              <a:t>Why is no output generated by this code:</a:t>
             </a:r>
           </a:p>
         </p:txBody>
@@ -4018,7 +4023,7 @@
                 </a:solidFill>
                 <a:latin typeface="Lucida Console" panose="020B0609040504020204" pitchFamily="49" charset="0"/>
               </a:rPr>
-              <a:t>Questions</a:t>
+              <a:t>Question #13</a:t>
             </a:r>
           </a:p>
         </p:txBody>
@@ -4050,7 +4055,7 @@
                   <a:schemeClr val="bg1"/>
                 </a:solidFill>
               </a:rPr>
-              <a:t>When using array indexing, in PowerShell, which notation can be used to select the last 10 objects of an array?</a:t>
+              <a:t>When using array indexing in PowerShell, which notation can be used to select the last 10 objects of an array?</a:t>
             </a:r>
           </a:p>
         </p:txBody>
@@ -4107,7 +4112,7 @@
                 </a:solidFill>
                 <a:latin typeface="Lucida Console" panose="020B0609040504020204" pitchFamily="49" charset="0"/>
               </a:rPr>
-              <a:t>Questions</a:t>
+              <a:t>Question #14</a:t>
             </a:r>
           </a:p>
         </p:txBody>
@@ -4242,23 +4247,7 @@
                   <a:schemeClr val="bg1"/>
                 </a:solidFill>
               </a:rPr>
-              <a:t>Team up with </a:t>
-            </a:r>
-            <a:r>
-              <a:rPr lang="en-US" sz="3200" dirty="0" err="1">
-                <a:solidFill>
-                  <a:schemeClr val="bg1"/>
-                </a:solidFill>
-              </a:rPr>
-              <a:t>with</a:t>
-            </a:r>
-            <a:r>
-              <a:rPr lang="en-US" sz="3200" dirty="0">
-                <a:solidFill>
-                  <a:schemeClr val="bg1"/>
-                </a:solidFill>
-              </a:rPr>
-              <a:t> others</a:t>
+              <a:t>Team up with others</a:t>
             </a:r>
           </a:p>
           <a:p>
@@ -4370,7 +4359,7 @@
                 </a:solidFill>
                 <a:latin typeface="Lucida Console" panose="020B0609040504020204" pitchFamily="49" charset="0"/>
               </a:rPr>
-              <a:t>Questions</a:t>
+              <a:t>Question #15</a:t>
             </a:r>
           </a:p>
         </p:txBody>
@@ -4470,7 +4459,7 @@
                 </a:solidFill>
                 <a:latin typeface="Lucida Console" panose="020B0609040504020204" pitchFamily="49" charset="0"/>
               </a:rPr>
-              <a:t>Questions</a:t>
+              <a:t>Question #16</a:t>
             </a:r>
           </a:p>
         </p:txBody>
@@ -4588,7 +4577,7 @@
                 </a:solidFill>
                 <a:latin typeface="Lucida Console" panose="020B0609040504020204" pitchFamily="49" charset="0"/>
               </a:rPr>
-              <a:t>Questions</a:t>
+              <a:t>Question #17</a:t>
             </a:r>
           </a:p>
         </p:txBody>
@@ -4677,7 +4666,7 @@
                 </a:solidFill>
                 <a:latin typeface="Lucida Console" panose="020B0609040504020204" pitchFamily="49" charset="0"/>
               </a:rPr>
-              <a:t>Questions</a:t>
+              <a:t>Question #18</a:t>
             </a:r>
           </a:p>
         </p:txBody>
@@ -4782,7 +4771,7 @@
                 </a:solidFill>
                 <a:latin typeface="Lucida Console" panose="020B0609040504020204" pitchFamily="49" charset="0"/>
               </a:rPr>
-              <a:t>Questions</a:t>
+              <a:t>Question #19</a:t>
             </a:r>
           </a:p>
         </p:txBody>
@@ -4814,7 +4803,7 @@
                   <a:schemeClr val="bg1"/>
                 </a:solidFill>
               </a:rPr>
-              <a:t>The percentage symbol, %, is an alias in PowerShell. What is a lesser known function of % in the PowerShell language?</a:t>
+              <a:t>The percentage symbol, %, is an alias in PowerShell. What is a lesser known function of this symbol in the PowerShell language?</a:t>
             </a:r>
           </a:p>
         </p:txBody>
@@ -4871,7 +4860,7 @@
                 </a:solidFill>
                 <a:latin typeface="Lucida Console" panose="020B0609040504020204" pitchFamily="49" charset="0"/>
               </a:rPr>
-              <a:t>Questions</a:t>
+              <a:t>Question #20</a:t>
             </a:r>
           </a:p>
         </p:txBody>
@@ -4984,7 +4973,7 @@
                 </a:solidFill>
                 <a:latin typeface="Lucida Console" panose="020B0609040504020204" pitchFamily="49" charset="0"/>
               </a:rPr>
-              <a:t>Questions</a:t>
+              <a:t>Question #21</a:t>
             </a:r>
           </a:p>
         </p:txBody>
@@ -5598,7 +5587,7 @@
                 </a:solidFill>
                 <a:latin typeface="Lucida Console" panose="020B0609040504020204" pitchFamily="49" charset="0"/>
               </a:rPr>
-              <a:t>Questions</a:t>
+              <a:t>Question #1</a:t>
             </a:r>
           </a:p>
         </p:txBody>
@@ -5687,7 +5676,7 @@
                 </a:solidFill>
                 <a:latin typeface="Lucida Console" panose="020B0609040504020204" pitchFamily="49" charset="0"/>
               </a:rPr>
-              <a:t>Questions</a:t>
+              <a:t>Question #2</a:t>
             </a:r>
           </a:p>
         </p:txBody>
@@ -5776,7 +5765,7 @@
                 </a:solidFill>
                 <a:latin typeface="Lucida Console" panose="020B0609040504020204" pitchFamily="49" charset="0"/>
               </a:rPr>
-              <a:t>Questions</a:t>
+              <a:t>Question #3</a:t>
             </a:r>
           </a:p>
         </p:txBody>
@@ -5865,7 +5854,7 @@
                 </a:solidFill>
                 <a:latin typeface="Lucida Console" panose="020B0609040504020204" pitchFamily="49" charset="0"/>
               </a:rPr>
-              <a:t>Questions</a:t>
+              <a:t>Question #4</a:t>
             </a:r>
           </a:p>
         </p:txBody>

</xml_diff>